<commit_message>
refactor: images and slide title
</commit_message>
<xml_diff>
--- a/images/figures.pptx
+++ b/images/figures.pptx
@@ -261,7 +261,7 @@
           <a:p>
             <a:fld id="{F7629C0C-AFAF-9845-8371-7CE497ABAF14}" type="datetimeFigureOut">
               <a:rPr lang="en-US" smtClean="0"/>
-              <a:t>6/15/21</a:t>
+              <a:t>7/20/21</a:t>
             </a:fld>
             <a:endParaRPr lang="en-US"/>
           </a:p>
@@ -459,7 +459,7 @@
           <a:p>
             <a:fld id="{F7629C0C-AFAF-9845-8371-7CE497ABAF14}" type="datetimeFigureOut">
               <a:rPr lang="en-US" smtClean="0"/>
-              <a:t>6/15/21</a:t>
+              <a:t>7/20/21</a:t>
             </a:fld>
             <a:endParaRPr lang="en-US"/>
           </a:p>
@@ -667,7 +667,7 @@
           <a:p>
             <a:fld id="{F7629C0C-AFAF-9845-8371-7CE497ABAF14}" type="datetimeFigureOut">
               <a:rPr lang="en-US" smtClean="0"/>
-              <a:t>6/15/21</a:t>
+              <a:t>7/20/21</a:t>
             </a:fld>
             <a:endParaRPr lang="en-US"/>
           </a:p>
@@ -865,7 +865,7 @@
           <a:p>
             <a:fld id="{F7629C0C-AFAF-9845-8371-7CE497ABAF14}" type="datetimeFigureOut">
               <a:rPr lang="en-US" smtClean="0"/>
-              <a:t>6/15/21</a:t>
+              <a:t>7/20/21</a:t>
             </a:fld>
             <a:endParaRPr lang="en-US"/>
           </a:p>
@@ -1140,7 +1140,7 @@
           <a:p>
             <a:fld id="{F7629C0C-AFAF-9845-8371-7CE497ABAF14}" type="datetimeFigureOut">
               <a:rPr lang="en-US" smtClean="0"/>
-              <a:t>6/15/21</a:t>
+              <a:t>7/20/21</a:t>
             </a:fld>
             <a:endParaRPr lang="en-US"/>
           </a:p>
@@ -1405,7 +1405,7 @@
           <a:p>
             <a:fld id="{F7629C0C-AFAF-9845-8371-7CE497ABAF14}" type="datetimeFigureOut">
               <a:rPr lang="en-US" smtClean="0"/>
-              <a:t>6/15/21</a:t>
+              <a:t>7/20/21</a:t>
             </a:fld>
             <a:endParaRPr lang="en-US"/>
           </a:p>
@@ -1817,7 +1817,7 @@
           <a:p>
             <a:fld id="{F7629C0C-AFAF-9845-8371-7CE497ABAF14}" type="datetimeFigureOut">
               <a:rPr lang="en-US" smtClean="0"/>
-              <a:t>6/15/21</a:t>
+              <a:t>7/20/21</a:t>
             </a:fld>
             <a:endParaRPr lang="en-US"/>
           </a:p>
@@ -1958,7 +1958,7 @@
           <a:p>
             <a:fld id="{F7629C0C-AFAF-9845-8371-7CE497ABAF14}" type="datetimeFigureOut">
               <a:rPr lang="en-US" smtClean="0"/>
-              <a:t>6/15/21</a:t>
+              <a:t>7/20/21</a:t>
             </a:fld>
             <a:endParaRPr lang="en-US"/>
           </a:p>
@@ -2071,7 +2071,7 @@
           <a:p>
             <a:fld id="{F7629C0C-AFAF-9845-8371-7CE497ABAF14}" type="datetimeFigureOut">
               <a:rPr lang="en-US" smtClean="0"/>
-              <a:t>6/15/21</a:t>
+              <a:t>7/20/21</a:t>
             </a:fld>
             <a:endParaRPr lang="en-US"/>
           </a:p>
@@ -2382,7 +2382,7 @@
           <a:p>
             <a:fld id="{F7629C0C-AFAF-9845-8371-7CE497ABAF14}" type="datetimeFigureOut">
               <a:rPr lang="en-US" smtClean="0"/>
-              <a:t>6/15/21</a:t>
+              <a:t>7/20/21</a:t>
             </a:fld>
             <a:endParaRPr lang="en-US"/>
           </a:p>
@@ -2670,7 +2670,7 @@
           <a:p>
             <a:fld id="{F7629C0C-AFAF-9845-8371-7CE497ABAF14}" type="datetimeFigureOut">
               <a:rPr lang="en-US" smtClean="0"/>
-              <a:t>6/15/21</a:t>
+              <a:t>7/20/21</a:t>
             </a:fld>
             <a:endParaRPr lang="en-US"/>
           </a:p>
@@ -2911,7 +2911,7 @@
           <a:p>
             <a:fld id="{F7629C0C-AFAF-9845-8371-7CE497ABAF14}" type="datetimeFigureOut">
               <a:rPr lang="en-US" smtClean="0"/>
-              <a:t>6/15/21</a:t>
+              <a:t>7/20/21</a:t>
             </a:fld>
             <a:endParaRPr lang="en-US"/>
           </a:p>
@@ -3350,7 +3350,7 @@
         </p:blipFill>
         <p:spPr>
           <a:xfrm rot="2711540">
-            <a:off x="3004345" y="3814602"/>
+            <a:off x="1119266" y="1951672"/>
             <a:ext cx="2971791" cy="2632804"/>
           </a:xfrm>
           <a:prstGeom prst="rect">
@@ -3376,8 +3376,8 @@
         </p:nvSpPr>
         <p:spPr>
           <a:xfrm>
-            <a:off x="3133795" y="31399"/>
-            <a:ext cx="2874259" cy="737870"/>
+            <a:off x="1420017" y="667823"/>
+            <a:ext cx="2668472" cy="737870"/>
           </a:xfrm>
         </p:spPr>
         <p:txBody>
@@ -3430,8 +3430,8 @@
         </p:nvSpPr>
         <p:spPr>
           <a:xfrm>
-            <a:off x="8156894" y="50195"/>
-            <a:ext cx="1871472" cy="737870"/>
+            <a:off x="6194717" y="675582"/>
+            <a:ext cx="1579592" cy="737870"/>
           </a:xfrm>
           <a:prstGeom prst="rect">
             <a:avLst/>
@@ -3638,686 +3638,6 @@
           </a:p>
         </p:txBody>
       </p:sp>
-      <p:sp>
-        <p:nvSpPr>
-          <p:cNvPr id="6" name="Content Placeholder 2">
-            <a:extLst>
-              <a:ext uri="{FF2B5EF4-FFF2-40B4-BE49-F238E27FC236}">
-                <a16:creationId xmlns:a16="http://schemas.microsoft.com/office/drawing/2014/main" id="{F5DFFB0B-1F38-954B-8C43-533432F3476A}"/>
-              </a:ext>
-            </a:extLst>
-          </p:cNvPr>
-          <p:cNvSpPr txBox="1">
-            <a:spLocks/>
-          </p:cNvSpPr>
-          <p:nvPr/>
-        </p:nvSpPr>
-        <p:spPr>
-          <a:xfrm>
-            <a:off x="27878" y="1680129"/>
-            <a:ext cx="2145792" cy="737870"/>
-          </a:xfrm>
-          <a:prstGeom prst="rect">
-            <a:avLst/>
-          </a:prstGeom>
-        </p:spPr>
-        <p:txBody>
-          <a:bodyPr vert="horz" lIns="91440" tIns="45720" rIns="91440" bIns="45720" rtlCol="0">
-            <a:normAutofit/>
-          </a:bodyPr>
-          <a:lstStyle>
-            <a:lvl1pPr marL="228600" indent="-228600" algn="l" defTabSz="914400" rtl="0" eaLnBrk="1" latinLnBrk="0" hangingPunct="1">
-              <a:lnSpc>
-                <a:spcPct val="90000"/>
-              </a:lnSpc>
-              <a:spcBef>
-                <a:spcPts val="1000"/>
-              </a:spcBef>
-              <a:buFont typeface="Arial" panose="020B0604020202020204" pitchFamily="34" charset="0"/>
-              <a:buChar char="•"/>
-              <a:defRPr sz="2800" kern="1200">
-                <a:solidFill>
-                  <a:schemeClr val="tx1"/>
-                </a:solidFill>
-                <a:latin typeface="+mn-lt"/>
-                <a:ea typeface="+mn-ea"/>
-                <a:cs typeface="+mn-cs"/>
-              </a:defRPr>
-            </a:lvl1pPr>
-            <a:lvl2pPr marL="685800" indent="-228600" algn="l" defTabSz="914400" rtl="0" eaLnBrk="1" latinLnBrk="0" hangingPunct="1">
-              <a:lnSpc>
-                <a:spcPct val="90000"/>
-              </a:lnSpc>
-              <a:spcBef>
-                <a:spcPts val="500"/>
-              </a:spcBef>
-              <a:buFont typeface="Arial" panose="020B0604020202020204" pitchFamily="34" charset="0"/>
-              <a:buChar char="•"/>
-              <a:defRPr sz="2400" kern="1200">
-                <a:solidFill>
-                  <a:schemeClr val="tx1"/>
-                </a:solidFill>
-                <a:latin typeface="+mn-lt"/>
-                <a:ea typeface="+mn-ea"/>
-                <a:cs typeface="+mn-cs"/>
-              </a:defRPr>
-            </a:lvl2pPr>
-            <a:lvl3pPr marL="1143000" indent="-228600" algn="l" defTabSz="914400" rtl="0" eaLnBrk="1" latinLnBrk="0" hangingPunct="1">
-              <a:lnSpc>
-                <a:spcPct val="90000"/>
-              </a:lnSpc>
-              <a:spcBef>
-                <a:spcPts val="500"/>
-              </a:spcBef>
-              <a:buFont typeface="Arial" panose="020B0604020202020204" pitchFamily="34" charset="0"/>
-              <a:buChar char="•"/>
-              <a:defRPr sz="2000" kern="1200">
-                <a:solidFill>
-                  <a:schemeClr val="tx1"/>
-                </a:solidFill>
-                <a:latin typeface="+mn-lt"/>
-                <a:ea typeface="+mn-ea"/>
-                <a:cs typeface="+mn-cs"/>
-              </a:defRPr>
-            </a:lvl3pPr>
-            <a:lvl4pPr marL="1600200" indent="-228600" algn="l" defTabSz="914400" rtl="0" eaLnBrk="1" latinLnBrk="0" hangingPunct="1">
-              <a:lnSpc>
-                <a:spcPct val="90000"/>
-              </a:lnSpc>
-              <a:spcBef>
-                <a:spcPts val="500"/>
-              </a:spcBef>
-              <a:buFont typeface="Arial" panose="020B0604020202020204" pitchFamily="34" charset="0"/>
-              <a:buChar char="•"/>
-              <a:defRPr sz="1800" kern="1200">
-                <a:solidFill>
-                  <a:schemeClr val="tx1"/>
-                </a:solidFill>
-                <a:latin typeface="+mn-lt"/>
-                <a:ea typeface="+mn-ea"/>
-                <a:cs typeface="+mn-cs"/>
-              </a:defRPr>
-            </a:lvl4pPr>
-            <a:lvl5pPr marL="2057400" indent="-228600" algn="l" defTabSz="914400" rtl="0" eaLnBrk="1" latinLnBrk="0" hangingPunct="1">
-              <a:lnSpc>
-                <a:spcPct val="90000"/>
-              </a:lnSpc>
-              <a:spcBef>
-                <a:spcPts val="500"/>
-              </a:spcBef>
-              <a:buFont typeface="Arial" panose="020B0604020202020204" pitchFamily="34" charset="0"/>
-              <a:buChar char="•"/>
-              <a:defRPr sz="1800" kern="1200">
-                <a:solidFill>
-                  <a:schemeClr val="tx1"/>
-                </a:solidFill>
-                <a:latin typeface="+mn-lt"/>
-                <a:ea typeface="+mn-ea"/>
-                <a:cs typeface="+mn-cs"/>
-              </a:defRPr>
-            </a:lvl5pPr>
-            <a:lvl6pPr marL="2514600" indent="-228600" algn="l" defTabSz="914400" rtl="0" eaLnBrk="1" latinLnBrk="0" hangingPunct="1">
-              <a:lnSpc>
-                <a:spcPct val="90000"/>
-              </a:lnSpc>
-              <a:spcBef>
-                <a:spcPts val="500"/>
-              </a:spcBef>
-              <a:buFont typeface="Arial" panose="020B0604020202020204" pitchFamily="34" charset="0"/>
-              <a:buChar char="•"/>
-              <a:defRPr sz="1800" kern="1200">
-                <a:solidFill>
-                  <a:schemeClr val="tx1"/>
-                </a:solidFill>
-                <a:latin typeface="+mn-lt"/>
-                <a:ea typeface="+mn-ea"/>
-                <a:cs typeface="+mn-cs"/>
-              </a:defRPr>
-            </a:lvl6pPr>
-            <a:lvl7pPr marL="2971800" indent="-228600" algn="l" defTabSz="914400" rtl="0" eaLnBrk="1" latinLnBrk="0" hangingPunct="1">
-              <a:lnSpc>
-                <a:spcPct val="90000"/>
-              </a:lnSpc>
-              <a:spcBef>
-                <a:spcPts val="500"/>
-              </a:spcBef>
-              <a:buFont typeface="Arial" panose="020B0604020202020204" pitchFamily="34" charset="0"/>
-              <a:buChar char="•"/>
-              <a:defRPr sz="1800" kern="1200">
-                <a:solidFill>
-                  <a:schemeClr val="tx1"/>
-                </a:solidFill>
-                <a:latin typeface="+mn-lt"/>
-                <a:ea typeface="+mn-ea"/>
-                <a:cs typeface="+mn-cs"/>
-              </a:defRPr>
-            </a:lvl7pPr>
-            <a:lvl8pPr marL="3429000" indent="-228600" algn="l" defTabSz="914400" rtl="0" eaLnBrk="1" latinLnBrk="0" hangingPunct="1">
-              <a:lnSpc>
-                <a:spcPct val="90000"/>
-              </a:lnSpc>
-              <a:spcBef>
-                <a:spcPts val="500"/>
-              </a:spcBef>
-              <a:buFont typeface="Arial" panose="020B0604020202020204" pitchFamily="34" charset="0"/>
-              <a:buChar char="•"/>
-              <a:defRPr sz="1800" kern="1200">
-                <a:solidFill>
-                  <a:schemeClr val="tx1"/>
-                </a:solidFill>
-                <a:latin typeface="+mn-lt"/>
-                <a:ea typeface="+mn-ea"/>
-                <a:cs typeface="+mn-cs"/>
-              </a:defRPr>
-            </a:lvl8pPr>
-            <a:lvl9pPr marL="3886200" indent="-228600" algn="l" defTabSz="914400" rtl="0" eaLnBrk="1" latinLnBrk="0" hangingPunct="1">
-              <a:lnSpc>
-                <a:spcPct val="90000"/>
-              </a:lnSpc>
-              <a:spcBef>
-                <a:spcPts val="500"/>
-              </a:spcBef>
-              <a:buFont typeface="Arial" panose="020B0604020202020204" pitchFamily="34" charset="0"/>
-              <a:buChar char="•"/>
-              <a:defRPr sz="1800" kern="1200">
-                <a:solidFill>
-                  <a:schemeClr val="tx1"/>
-                </a:solidFill>
-                <a:latin typeface="+mn-lt"/>
-                <a:ea typeface="+mn-ea"/>
-                <a:cs typeface="+mn-cs"/>
-              </a:defRPr>
-            </a:lvl9pPr>
-          </a:lstStyle>
-          <a:p>
-            <a:pPr marL="0" indent="0" algn="ctr">
-              <a:buFont typeface="Arial" panose="020B0604020202020204" pitchFamily="34" charset="0"/>
-              <a:buNone/>
-            </a:pPr>
-            <a:r>
-              <a:rPr lang="en-US" sz="4400" dirty="0"/>
-              <a:t>Burden</a:t>
-            </a:r>
-          </a:p>
-          <a:p>
-            <a:pPr marL="0" indent="0">
-              <a:buFont typeface="Arial" panose="020B0604020202020204" pitchFamily="34" charset="0"/>
-              <a:buNone/>
-            </a:pPr>
-            <a:endParaRPr lang="en-US" dirty="0"/>
-          </a:p>
-          <a:p>
-            <a:pPr marL="0" indent="0">
-              <a:buFont typeface="Arial" panose="020B0604020202020204" pitchFamily="34" charset="0"/>
-              <a:buNone/>
-            </a:pPr>
-            <a:endParaRPr lang="en-US" dirty="0"/>
-          </a:p>
-          <a:p>
-            <a:pPr marL="0" indent="0">
-              <a:buFont typeface="Arial" panose="020B0604020202020204" pitchFamily="34" charset="0"/>
-              <a:buNone/>
-            </a:pPr>
-            <a:endParaRPr lang="en-US" dirty="0"/>
-          </a:p>
-        </p:txBody>
-      </p:sp>
-      <p:sp>
-        <p:nvSpPr>
-          <p:cNvPr id="7" name="Content Placeholder 2">
-            <a:extLst>
-              <a:ext uri="{FF2B5EF4-FFF2-40B4-BE49-F238E27FC236}">
-                <a16:creationId xmlns:a16="http://schemas.microsoft.com/office/drawing/2014/main" id="{6DCE98EF-D9C3-9247-A15A-9AD29150586F}"/>
-              </a:ext>
-            </a:extLst>
-          </p:cNvPr>
-          <p:cNvSpPr txBox="1">
-            <a:spLocks/>
-          </p:cNvSpPr>
-          <p:nvPr/>
-        </p:nvSpPr>
-        <p:spPr>
-          <a:xfrm>
-            <a:off x="-109728" y="4692008"/>
-            <a:ext cx="2377440" cy="737870"/>
-          </a:xfrm>
-          <a:prstGeom prst="rect">
-            <a:avLst/>
-          </a:prstGeom>
-        </p:spPr>
-        <p:txBody>
-          <a:bodyPr vert="horz" lIns="91440" tIns="45720" rIns="91440" bIns="45720" rtlCol="0">
-            <a:normAutofit/>
-          </a:bodyPr>
-          <a:lstStyle>
-            <a:lvl1pPr marL="228600" indent="-228600" algn="l" defTabSz="914400" rtl="0" eaLnBrk="1" latinLnBrk="0" hangingPunct="1">
-              <a:lnSpc>
-                <a:spcPct val="90000"/>
-              </a:lnSpc>
-              <a:spcBef>
-                <a:spcPts val="1000"/>
-              </a:spcBef>
-              <a:buFont typeface="Arial" panose="020B0604020202020204" pitchFamily="34" charset="0"/>
-              <a:buChar char="•"/>
-              <a:defRPr sz="2800" kern="1200">
-                <a:solidFill>
-                  <a:schemeClr val="tx1"/>
-                </a:solidFill>
-                <a:latin typeface="+mn-lt"/>
-                <a:ea typeface="+mn-ea"/>
-                <a:cs typeface="+mn-cs"/>
-              </a:defRPr>
-            </a:lvl1pPr>
-            <a:lvl2pPr marL="685800" indent="-228600" algn="l" defTabSz="914400" rtl="0" eaLnBrk="1" latinLnBrk="0" hangingPunct="1">
-              <a:lnSpc>
-                <a:spcPct val="90000"/>
-              </a:lnSpc>
-              <a:spcBef>
-                <a:spcPts val="500"/>
-              </a:spcBef>
-              <a:buFont typeface="Arial" panose="020B0604020202020204" pitchFamily="34" charset="0"/>
-              <a:buChar char="•"/>
-              <a:defRPr sz="2400" kern="1200">
-                <a:solidFill>
-                  <a:schemeClr val="tx1"/>
-                </a:solidFill>
-                <a:latin typeface="+mn-lt"/>
-                <a:ea typeface="+mn-ea"/>
-                <a:cs typeface="+mn-cs"/>
-              </a:defRPr>
-            </a:lvl2pPr>
-            <a:lvl3pPr marL="1143000" indent="-228600" algn="l" defTabSz="914400" rtl="0" eaLnBrk="1" latinLnBrk="0" hangingPunct="1">
-              <a:lnSpc>
-                <a:spcPct val="90000"/>
-              </a:lnSpc>
-              <a:spcBef>
-                <a:spcPts val="500"/>
-              </a:spcBef>
-              <a:buFont typeface="Arial" panose="020B0604020202020204" pitchFamily="34" charset="0"/>
-              <a:buChar char="•"/>
-              <a:defRPr sz="2000" kern="1200">
-                <a:solidFill>
-                  <a:schemeClr val="tx1"/>
-                </a:solidFill>
-                <a:latin typeface="+mn-lt"/>
-                <a:ea typeface="+mn-ea"/>
-                <a:cs typeface="+mn-cs"/>
-              </a:defRPr>
-            </a:lvl3pPr>
-            <a:lvl4pPr marL="1600200" indent="-228600" algn="l" defTabSz="914400" rtl="0" eaLnBrk="1" latinLnBrk="0" hangingPunct="1">
-              <a:lnSpc>
-                <a:spcPct val="90000"/>
-              </a:lnSpc>
-              <a:spcBef>
-                <a:spcPts val="500"/>
-              </a:spcBef>
-              <a:buFont typeface="Arial" panose="020B0604020202020204" pitchFamily="34" charset="0"/>
-              <a:buChar char="•"/>
-              <a:defRPr sz="1800" kern="1200">
-                <a:solidFill>
-                  <a:schemeClr val="tx1"/>
-                </a:solidFill>
-                <a:latin typeface="+mn-lt"/>
-                <a:ea typeface="+mn-ea"/>
-                <a:cs typeface="+mn-cs"/>
-              </a:defRPr>
-            </a:lvl4pPr>
-            <a:lvl5pPr marL="2057400" indent="-228600" algn="l" defTabSz="914400" rtl="0" eaLnBrk="1" latinLnBrk="0" hangingPunct="1">
-              <a:lnSpc>
-                <a:spcPct val="90000"/>
-              </a:lnSpc>
-              <a:spcBef>
-                <a:spcPts val="500"/>
-              </a:spcBef>
-              <a:buFont typeface="Arial" panose="020B0604020202020204" pitchFamily="34" charset="0"/>
-              <a:buChar char="•"/>
-              <a:defRPr sz="1800" kern="1200">
-                <a:solidFill>
-                  <a:schemeClr val="tx1"/>
-                </a:solidFill>
-                <a:latin typeface="+mn-lt"/>
-                <a:ea typeface="+mn-ea"/>
-                <a:cs typeface="+mn-cs"/>
-              </a:defRPr>
-            </a:lvl5pPr>
-            <a:lvl6pPr marL="2514600" indent="-228600" algn="l" defTabSz="914400" rtl="0" eaLnBrk="1" latinLnBrk="0" hangingPunct="1">
-              <a:lnSpc>
-                <a:spcPct val="90000"/>
-              </a:lnSpc>
-              <a:spcBef>
-                <a:spcPts val="500"/>
-              </a:spcBef>
-              <a:buFont typeface="Arial" panose="020B0604020202020204" pitchFamily="34" charset="0"/>
-              <a:buChar char="•"/>
-              <a:defRPr sz="1800" kern="1200">
-                <a:solidFill>
-                  <a:schemeClr val="tx1"/>
-                </a:solidFill>
-                <a:latin typeface="+mn-lt"/>
-                <a:ea typeface="+mn-ea"/>
-                <a:cs typeface="+mn-cs"/>
-              </a:defRPr>
-            </a:lvl6pPr>
-            <a:lvl7pPr marL="2971800" indent="-228600" algn="l" defTabSz="914400" rtl="0" eaLnBrk="1" latinLnBrk="0" hangingPunct="1">
-              <a:lnSpc>
-                <a:spcPct val="90000"/>
-              </a:lnSpc>
-              <a:spcBef>
-                <a:spcPts val="500"/>
-              </a:spcBef>
-              <a:buFont typeface="Arial" panose="020B0604020202020204" pitchFamily="34" charset="0"/>
-              <a:buChar char="•"/>
-              <a:defRPr sz="1800" kern="1200">
-                <a:solidFill>
-                  <a:schemeClr val="tx1"/>
-                </a:solidFill>
-                <a:latin typeface="+mn-lt"/>
-                <a:ea typeface="+mn-ea"/>
-                <a:cs typeface="+mn-cs"/>
-              </a:defRPr>
-            </a:lvl7pPr>
-            <a:lvl8pPr marL="3429000" indent="-228600" algn="l" defTabSz="914400" rtl="0" eaLnBrk="1" latinLnBrk="0" hangingPunct="1">
-              <a:lnSpc>
-                <a:spcPct val="90000"/>
-              </a:lnSpc>
-              <a:spcBef>
-                <a:spcPts val="500"/>
-              </a:spcBef>
-              <a:buFont typeface="Arial" panose="020B0604020202020204" pitchFamily="34" charset="0"/>
-              <a:buChar char="•"/>
-              <a:defRPr sz="1800" kern="1200">
-                <a:solidFill>
-                  <a:schemeClr val="tx1"/>
-                </a:solidFill>
-                <a:latin typeface="+mn-lt"/>
-                <a:ea typeface="+mn-ea"/>
-                <a:cs typeface="+mn-cs"/>
-              </a:defRPr>
-            </a:lvl8pPr>
-            <a:lvl9pPr marL="3886200" indent="-228600" algn="l" defTabSz="914400" rtl="0" eaLnBrk="1" latinLnBrk="0" hangingPunct="1">
-              <a:lnSpc>
-                <a:spcPct val="90000"/>
-              </a:lnSpc>
-              <a:spcBef>
-                <a:spcPts val="500"/>
-              </a:spcBef>
-              <a:buFont typeface="Arial" panose="020B0604020202020204" pitchFamily="34" charset="0"/>
-              <a:buChar char="•"/>
-              <a:defRPr sz="1800" kern="1200">
-                <a:solidFill>
-                  <a:schemeClr val="tx1"/>
-                </a:solidFill>
-                <a:latin typeface="+mn-lt"/>
-                <a:ea typeface="+mn-ea"/>
-                <a:cs typeface="+mn-cs"/>
-              </a:defRPr>
-            </a:lvl9pPr>
-          </a:lstStyle>
-          <a:p>
-            <a:pPr marL="0" indent="0" algn="ctr">
-              <a:buFont typeface="Arial" panose="020B0604020202020204" pitchFamily="34" charset="0"/>
-              <a:buNone/>
-            </a:pPr>
-            <a:r>
-              <a:rPr lang="en-US" sz="4400" dirty="0"/>
-              <a:t>Behavior</a:t>
-            </a:r>
-          </a:p>
-          <a:p>
-            <a:pPr marL="0" indent="0">
-              <a:buFont typeface="Arial" panose="020B0604020202020204" pitchFamily="34" charset="0"/>
-              <a:buNone/>
-            </a:pPr>
-            <a:endParaRPr lang="en-US" dirty="0"/>
-          </a:p>
-          <a:p>
-            <a:pPr marL="0" indent="0">
-              <a:buFont typeface="Arial" panose="020B0604020202020204" pitchFamily="34" charset="0"/>
-              <a:buNone/>
-            </a:pPr>
-            <a:endParaRPr lang="en-US" dirty="0"/>
-          </a:p>
-          <a:p>
-            <a:pPr marL="0" indent="0">
-              <a:buFont typeface="Arial" panose="020B0604020202020204" pitchFamily="34" charset="0"/>
-              <a:buNone/>
-            </a:pPr>
-            <a:endParaRPr lang="en-US" dirty="0"/>
-          </a:p>
-        </p:txBody>
-      </p:sp>
-      <p:cxnSp>
-        <p:nvCxnSpPr>
-          <p:cNvPr id="10" name="Straight Connector 9">
-            <a:extLst>
-              <a:ext uri="{FF2B5EF4-FFF2-40B4-BE49-F238E27FC236}">
-                <a16:creationId xmlns:a16="http://schemas.microsoft.com/office/drawing/2014/main" id="{20E7E2E8-0EB8-904C-A333-C130CD3267C7}"/>
-              </a:ext>
-            </a:extLst>
-          </p:cNvPr>
-          <p:cNvCxnSpPr/>
-          <p:nvPr/>
-        </p:nvCxnSpPr>
-        <p:spPr>
-          <a:xfrm>
-            <a:off x="2228534" y="769269"/>
-            <a:ext cx="0" cy="5598414"/>
-          </a:xfrm>
-          <a:prstGeom prst="line">
-            <a:avLst/>
-          </a:prstGeom>
-          <a:ln w="28575"/>
-        </p:spPr>
-        <p:style>
-          <a:lnRef idx="1">
-            <a:schemeClr val="dk1"/>
-          </a:lnRef>
-          <a:fillRef idx="0">
-            <a:schemeClr val="dk1"/>
-          </a:fillRef>
-          <a:effectRef idx="0">
-            <a:schemeClr val="dk1"/>
-          </a:effectRef>
-          <a:fontRef idx="minor">
-            <a:schemeClr val="tx1"/>
-          </a:fontRef>
-        </p:style>
-      </p:cxnSp>
-      <p:cxnSp>
-        <p:nvCxnSpPr>
-          <p:cNvPr id="11" name="Straight Connector 10">
-            <a:extLst>
-              <a:ext uri="{FF2B5EF4-FFF2-40B4-BE49-F238E27FC236}">
-                <a16:creationId xmlns:a16="http://schemas.microsoft.com/office/drawing/2014/main" id="{5914B08C-DDC2-4746-BE37-2ED4BAF9B95D}"/>
-              </a:ext>
-            </a:extLst>
-          </p:cNvPr>
-          <p:cNvCxnSpPr>
-            <a:cxnSpLocks/>
-          </p:cNvCxnSpPr>
-          <p:nvPr/>
-        </p:nvCxnSpPr>
-        <p:spPr>
-          <a:xfrm>
-            <a:off x="6724334" y="769269"/>
-            <a:ext cx="0" cy="5598414"/>
-          </a:xfrm>
-          <a:prstGeom prst="line">
-            <a:avLst/>
-          </a:prstGeom>
-          <a:ln w="28575"/>
-        </p:spPr>
-        <p:style>
-          <a:lnRef idx="1">
-            <a:schemeClr val="dk1"/>
-          </a:lnRef>
-          <a:fillRef idx="0">
-            <a:schemeClr val="dk1"/>
-          </a:fillRef>
-          <a:effectRef idx="0">
-            <a:schemeClr val="dk1"/>
-          </a:effectRef>
-          <a:fontRef idx="minor">
-            <a:schemeClr val="tx1"/>
-          </a:fontRef>
-        </p:style>
-      </p:cxnSp>
-      <p:cxnSp>
-        <p:nvCxnSpPr>
-          <p:cNvPr id="13" name="Straight Connector 12">
-            <a:extLst>
-              <a:ext uri="{FF2B5EF4-FFF2-40B4-BE49-F238E27FC236}">
-                <a16:creationId xmlns:a16="http://schemas.microsoft.com/office/drawing/2014/main" id="{8B4D9DCF-43DD-8948-83DF-847F88A83C83}"/>
-              </a:ext>
-            </a:extLst>
-          </p:cNvPr>
-          <p:cNvCxnSpPr>
-            <a:cxnSpLocks/>
-          </p:cNvCxnSpPr>
-          <p:nvPr/>
-        </p:nvCxnSpPr>
-        <p:spPr>
-          <a:xfrm>
-            <a:off x="2530286" y="3222147"/>
-            <a:ext cx="3931920" cy="0"/>
-          </a:xfrm>
-          <a:prstGeom prst="line">
-            <a:avLst/>
-          </a:prstGeom>
-          <a:ln w="28575"/>
-        </p:spPr>
-        <p:style>
-          <a:lnRef idx="1">
-            <a:schemeClr val="dk1"/>
-          </a:lnRef>
-          <a:fillRef idx="0">
-            <a:schemeClr val="dk1"/>
-          </a:fillRef>
-          <a:effectRef idx="0">
-            <a:schemeClr val="dk1"/>
-          </a:effectRef>
-          <a:fontRef idx="minor">
-            <a:schemeClr val="tx1"/>
-          </a:fontRef>
-        </p:style>
-      </p:cxnSp>
-      <p:cxnSp>
-        <p:nvCxnSpPr>
-          <p:cNvPr id="16" name="Straight Connector 15">
-            <a:extLst>
-              <a:ext uri="{FF2B5EF4-FFF2-40B4-BE49-F238E27FC236}">
-                <a16:creationId xmlns:a16="http://schemas.microsoft.com/office/drawing/2014/main" id="{455F0522-D66E-3D45-890D-A26CC71A5C0C}"/>
-              </a:ext>
-            </a:extLst>
-          </p:cNvPr>
-          <p:cNvCxnSpPr>
-            <a:cxnSpLocks/>
-          </p:cNvCxnSpPr>
-          <p:nvPr/>
-        </p:nvCxnSpPr>
-        <p:spPr>
-          <a:xfrm>
-            <a:off x="6962078" y="3222147"/>
-            <a:ext cx="3931920" cy="0"/>
-          </a:xfrm>
-          <a:prstGeom prst="line">
-            <a:avLst/>
-          </a:prstGeom>
-          <a:ln w="28575"/>
-        </p:spPr>
-        <p:style>
-          <a:lnRef idx="1">
-            <a:schemeClr val="dk1"/>
-          </a:lnRef>
-          <a:fillRef idx="0">
-            <a:schemeClr val="dk1"/>
-          </a:fillRef>
-          <a:effectRef idx="0">
-            <a:schemeClr val="dk1"/>
-          </a:effectRef>
-          <a:fontRef idx="minor">
-            <a:schemeClr val="tx1"/>
-          </a:fontRef>
-        </p:style>
-      </p:cxnSp>
-      <p:cxnSp>
-        <p:nvCxnSpPr>
-          <p:cNvPr id="17" name="Straight Connector 16">
-            <a:extLst>
-              <a:ext uri="{FF2B5EF4-FFF2-40B4-BE49-F238E27FC236}">
-                <a16:creationId xmlns:a16="http://schemas.microsoft.com/office/drawing/2014/main" id="{198689F2-6D96-4C4D-8827-32E18F0FDF02}"/>
-              </a:ext>
-            </a:extLst>
-          </p:cNvPr>
-          <p:cNvCxnSpPr>
-            <a:cxnSpLocks/>
-          </p:cNvCxnSpPr>
-          <p:nvPr/>
-        </p:nvCxnSpPr>
-        <p:spPr>
-          <a:xfrm>
-            <a:off x="2530286" y="936147"/>
-            <a:ext cx="3931920" cy="0"/>
-          </a:xfrm>
-          <a:prstGeom prst="line">
-            <a:avLst/>
-          </a:prstGeom>
-          <a:ln w="28575"/>
-        </p:spPr>
-        <p:style>
-          <a:lnRef idx="1">
-            <a:schemeClr val="dk1"/>
-          </a:lnRef>
-          <a:fillRef idx="0">
-            <a:schemeClr val="dk1"/>
-          </a:fillRef>
-          <a:effectRef idx="0">
-            <a:schemeClr val="dk1"/>
-          </a:effectRef>
-          <a:fontRef idx="minor">
-            <a:schemeClr val="tx1"/>
-          </a:fontRef>
-        </p:style>
-      </p:cxnSp>
-      <p:cxnSp>
-        <p:nvCxnSpPr>
-          <p:cNvPr id="18" name="Straight Connector 17">
-            <a:extLst>
-              <a:ext uri="{FF2B5EF4-FFF2-40B4-BE49-F238E27FC236}">
-                <a16:creationId xmlns:a16="http://schemas.microsoft.com/office/drawing/2014/main" id="{EF3D458F-E18F-8C44-B4E4-BF5747199504}"/>
-              </a:ext>
-            </a:extLst>
-          </p:cNvPr>
-          <p:cNvCxnSpPr>
-            <a:cxnSpLocks/>
-          </p:cNvCxnSpPr>
-          <p:nvPr/>
-        </p:nvCxnSpPr>
-        <p:spPr>
-          <a:xfrm>
-            <a:off x="6962078" y="939195"/>
-            <a:ext cx="3931920" cy="0"/>
-          </a:xfrm>
-          <a:prstGeom prst="line">
-            <a:avLst/>
-          </a:prstGeom>
-          <a:ln w="28575"/>
-        </p:spPr>
-        <p:style>
-          <a:lnRef idx="1">
-            <a:schemeClr val="dk1"/>
-          </a:lnRef>
-          <a:fillRef idx="0">
-            <a:schemeClr val="dk1"/>
-          </a:fillRef>
-          <a:effectRef idx="0">
-            <a:schemeClr val="dk1"/>
-          </a:effectRef>
-          <a:fontRef idx="minor">
-            <a:schemeClr val="tx1"/>
-          </a:fontRef>
-        </p:style>
-      </p:cxnSp>
       <p:pic>
         <p:nvPicPr>
           <p:cNvPr id="20" name="Picture 19" descr="A silhouette of a person&#10;&#10;Description automatically generated with low confidence">
@@ -4340,7 +3660,7 @@
         </p:blipFill>
         <p:spPr>
           <a:xfrm>
-            <a:off x="7606734" y="3813792"/>
+            <a:off x="5492286" y="1220825"/>
             <a:ext cx="2971791" cy="2632804"/>
           </a:xfrm>
           <a:prstGeom prst="rect">
@@ -4362,8 +3682,8 @@
         </p:nvSpPr>
         <p:spPr>
           <a:xfrm>
-            <a:off x="3138052" y="6161944"/>
-            <a:ext cx="2889504" cy="868680"/>
+            <a:off x="1085386" y="3837464"/>
+            <a:ext cx="2889504" cy="1395758"/>
           </a:xfrm>
           <a:prstGeom prst="rect">
             <a:avLst/>
@@ -4414,8 +3734,8 @@
         </p:nvSpPr>
         <p:spPr>
           <a:xfrm>
-            <a:off x="2757544" y="5581300"/>
-            <a:ext cx="3337735" cy="699479"/>
+            <a:off x="1085386" y="3700402"/>
+            <a:ext cx="3337735" cy="147172"/>
           </a:xfrm>
           <a:prstGeom prst="rect">
             <a:avLst/>
@@ -4466,7 +3786,7 @@
         </p:nvSpPr>
         <p:spPr>
           <a:xfrm>
-            <a:off x="2283399" y="4712620"/>
+            <a:off x="379550" y="2833734"/>
             <a:ext cx="1783256" cy="868680"/>
           </a:xfrm>
           <a:prstGeom prst="rect">
@@ -4518,7 +3838,7 @@
         </p:nvSpPr>
         <p:spPr>
           <a:xfrm>
-            <a:off x="5828137" y="5412098"/>
+            <a:off x="3924288" y="3533212"/>
             <a:ext cx="597672" cy="177837"/>
           </a:xfrm>
           <a:prstGeom prst="rect">
@@ -4570,7 +3890,7 @@
         </p:nvSpPr>
         <p:spPr>
           <a:xfrm>
-            <a:off x="5579903" y="5383273"/>
+            <a:off x="3676054" y="3504387"/>
             <a:ext cx="597672" cy="206662"/>
           </a:xfrm>
           <a:prstGeom prst="rect">
@@ -4622,7 +3942,7 @@
         </p:nvSpPr>
         <p:spPr>
           <a:xfrm>
-            <a:off x="4844250" y="4666391"/>
+            <a:off x="2975123" y="2787505"/>
             <a:ext cx="956630" cy="962152"/>
           </a:xfrm>
           <a:prstGeom prst="ellipse">
@@ -4668,8 +3988,8 @@
         </p:nvSpPr>
         <p:spPr>
           <a:xfrm>
-            <a:off x="8293234" y="6488668"/>
-            <a:ext cx="2493952" cy="369332"/>
+            <a:off x="6662584" y="3952113"/>
+            <a:ext cx="1718356" cy="276999"/>
           </a:xfrm>
           <a:prstGeom prst="rect">
             <a:avLst/>
@@ -4683,228 +4003,184 @@
           <a:lstStyle/>
           <a:p>
             <a:r>
-              <a:rPr lang="en-US" dirty="0">
+              <a:rPr lang="en-US" sz="1200" dirty="0">
                 <a:hlinkClick r:id="rId3"/>
               </a:rPr>
               <a:t>https://openclipart.org/</a:t>
             </a:r>
             <a:r>
-              <a:rPr lang="en-US" dirty="0"/>
+              <a:rPr lang="en-US" sz="1200" dirty="0"/>
               <a:t> </a:t>
             </a:r>
           </a:p>
         </p:txBody>
       </p:sp>
-      <p:pic>
-        <p:nvPicPr>
-          <p:cNvPr id="39" name="Picture 38">
-            <a:extLst>
-              <a:ext uri="{FF2B5EF4-FFF2-40B4-BE49-F238E27FC236}">
-                <a16:creationId xmlns:a16="http://schemas.microsoft.com/office/drawing/2014/main" id="{E3CE3338-9B72-9D45-B749-FFA8DA17D350}"/>
-              </a:ext>
-            </a:extLst>
-          </p:cNvPr>
-          <p:cNvPicPr>
-            <a:picLocks noChangeAspect="1"/>
-          </p:cNvPicPr>
+      <p:sp>
+        <p:nvSpPr>
+          <p:cNvPr id="2" name="TextBox 1">
+            <a:extLst>
+              <a:ext uri="{FF2B5EF4-FFF2-40B4-BE49-F238E27FC236}">
+                <a16:creationId xmlns:a16="http://schemas.microsoft.com/office/drawing/2014/main" id="{DA68368D-C28F-2940-B865-C7F13158E562}"/>
+              </a:ext>
+            </a:extLst>
+          </p:cNvPr>
+          <p:cNvSpPr txBox="1"/>
           <p:nvPr/>
-        </p:nvPicPr>
-        <p:blipFill>
-          <a:blip r:embed="rId4"/>
-          <a:stretch>
-            <a:fillRect/>
-          </a:stretch>
-        </p:blipFill>
-        <p:spPr>
-          <a:xfrm>
-            <a:off x="4007756" y="1521501"/>
-            <a:ext cx="743989" cy="955410"/>
+        </p:nvSpPr>
+        <p:spPr>
+          <a:xfrm>
+            <a:off x="1891826" y="2121356"/>
+            <a:ext cx="835485" cy="923330"/>
           </a:xfrm>
           <a:prstGeom prst="rect">
             <a:avLst/>
           </a:prstGeom>
-        </p:spPr>
-      </p:pic>
-      <p:pic>
-        <p:nvPicPr>
-          <p:cNvPr id="40" name="Picture 39">
-            <a:extLst>
-              <a:ext uri="{FF2B5EF4-FFF2-40B4-BE49-F238E27FC236}">
-                <a16:creationId xmlns:a16="http://schemas.microsoft.com/office/drawing/2014/main" id="{191EB4B0-7FB0-8F44-93F0-BFF37C588766}"/>
-              </a:ext>
-            </a:extLst>
-          </p:cNvPr>
-          <p:cNvPicPr>
-            <a:picLocks noChangeAspect="1"/>
-          </p:cNvPicPr>
+          <a:noFill/>
+        </p:spPr>
+        <p:txBody>
+          <a:bodyPr wrap="square" rtlCol="0">
+            <a:spAutoFit/>
+          </a:bodyPr>
+          <a:lstStyle/>
+          <a:p>
+            <a:r>
+              <a:rPr lang="en-US" sz="5400" dirty="0"/>
+              <a:t>1x</a:t>
+            </a:r>
+          </a:p>
+        </p:txBody>
+      </p:sp>
+      <p:sp>
+        <p:nvSpPr>
+          <p:cNvPr id="32" name="TextBox 31">
+            <a:extLst>
+              <a:ext uri="{FF2B5EF4-FFF2-40B4-BE49-F238E27FC236}">
+                <a16:creationId xmlns:a16="http://schemas.microsoft.com/office/drawing/2014/main" id="{299D7C7B-B3C0-D749-BA7D-590F9E403FDB}"/>
+              </a:ext>
+            </a:extLst>
+          </p:cNvPr>
+          <p:cNvSpPr txBox="1"/>
           <p:nvPr/>
-        </p:nvPicPr>
-        <p:blipFill>
-          <a:blip r:embed="rId4"/>
-          <a:stretch>
-            <a:fillRect/>
-          </a:stretch>
-        </p:blipFill>
-        <p:spPr>
-          <a:xfrm>
-            <a:off x="7440615" y="1571359"/>
-            <a:ext cx="743989" cy="955410"/>
+        </p:nvSpPr>
+        <p:spPr>
+          <a:xfrm>
+            <a:off x="5398589" y="1727302"/>
+            <a:ext cx="1579592" cy="1323439"/>
           </a:xfrm>
           <a:prstGeom prst="rect">
             <a:avLst/>
           </a:prstGeom>
-        </p:spPr>
-      </p:pic>
-      <p:pic>
-        <p:nvPicPr>
-          <p:cNvPr id="44" name="Picture 43">
-            <a:extLst>
-              <a:ext uri="{FF2B5EF4-FFF2-40B4-BE49-F238E27FC236}">
-                <a16:creationId xmlns:a16="http://schemas.microsoft.com/office/drawing/2014/main" id="{2B560CA8-343E-734D-B1B2-FF91B4FB155D}"/>
-              </a:ext>
-            </a:extLst>
-          </p:cNvPr>
-          <p:cNvPicPr>
-            <a:picLocks noChangeAspect="1"/>
-          </p:cNvPicPr>
+          <a:noFill/>
+        </p:spPr>
+        <p:txBody>
+          <a:bodyPr wrap="square" rtlCol="0">
+            <a:spAutoFit/>
+          </a:bodyPr>
+          <a:lstStyle/>
+          <a:p>
+            <a:r>
+              <a:rPr lang="en-US" sz="4000" dirty="0"/>
+              <a:t>10x?</a:t>
+            </a:r>
+          </a:p>
+          <a:p>
+            <a:r>
+              <a:rPr lang="en-US" sz="4000" dirty="0"/>
+              <a:t>100x?</a:t>
+            </a:r>
+          </a:p>
+        </p:txBody>
+      </p:sp>
+      <p:sp>
+        <p:nvSpPr>
+          <p:cNvPr id="8" name="AutoShape 2" descr="\infty ">
+            <a:extLst>
+              <a:ext uri="{FF2B5EF4-FFF2-40B4-BE49-F238E27FC236}">
+                <a16:creationId xmlns:a16="http://schemas.microsoft.com/office/drawing/2014/main" id="{9339897A-5D7B-0E4C-90D2-D877F995269E}"/>
+              </a:ext>
+            </a:extLst>
+          </p:cNvPr>
+          <p:cNvSpPr>
+            <a:spLocks noChangeAspect="1" noChangeArrowheads="1"/>
+          </p:cNvSpPr>
           <p:nvPr/>
-        </p:nvPicPr>
-        <p:blipFill>
-          <a:blip r:embed="rId5"/>
-          <a:stretch>
-            <a:fillRect/>
-          </a:stretch>
-        </p:blipFill>
-        <p:spPr>
-          <a:xfrm>
-            <a:off x="9377224" y="1483443"/>
-            <a:ext cx="1302284" cy="1272115"/>
+        </p:nvSpPr>
+        <p:spPr bwMode="auto">
+          <a:xfrm>
+            <a:off x="112713" y="-144463"/>
+            <a:ext cx="304800" cy="304801"/>
           </a:xfrm>
           <a:prstGeom prst="rect">
             <a:avLst/>
           </a:prstGeom>
-        </p:spPr>
-      </p:pic>
-      <p:pic>
-        <p:nvPicPr>
-          <p:cNvPr id="45" name="Picture 44">
-            <a:extLst>
-              <a:ext uri="{FF2B5EF4-FFF2-40B4-BE49-F238E27FC236}">
-                <a16:creationId xmlns:a16="http://schemas.microsoft.com/office/drawing/2014/main" id="{8B3D63CD-6087-904F-B5A0-C12A2CA3ABDE}"/>
-              </a:ext>
-            </a:extLst>
-          </p:cNvPr>
-          <p:cNvPicPr>
-            <a:picLocks noChangeAspect="1"/>
-          </p:cNvPicPr>
+          <a:noFill/>
+          <a:extLst>
+            <a:ext uri="{909E8E84-426E-40DD-AFC4-6F175D3DCCD1}">
+              <a14:hiddenFill xmlns:a14="http://schemas.microsoft.com/office/drawing/2010/main">
+                <a:solidFill>
+                  <a:srgbClr val="FFFFFF"/>
+                </a:solidFill>
+              </a14:hiddenFill>
+            </a:ext>
+          </a:extLst>
+        </p:spPr>
+        <p:txBody>
+          <a:bodyPr vert="horz" wrap="square" lIns="91440" tIns="45720" rIns="91440" bIns="45720" numCol="1" anchor="t" anchorCtr="0" compatLnSpc="1">
+            <a:prstTxWarp prst="textNoShape">
+              <a:avLst/>
+            </a:prstTxWarp>
+          </a:bodyPr>
+          <a:lstStyle/>
+          <a:p>
+            <a:endParaRPr lang="en-US"/>
+          </a:p>
+        </p:txBody>
+      </p:sp>
+      <p:sp>
+        <p:nvSpPr>
+          <p:cNvPr id="12" name="AutoShape 4" descr="\infty ">
+            <a:extLst>
+              <a:ext uri="{FF2B5EF4-FFF2-40B4-BE49-F238E27FC236}">
+                <a16:creationId xmlns:a16="http://schemas.microsoft.com/office/drawing/2014/main" id="{8DB70CD4-0FA8-EF41-94BC-003FADC32FD5}"/>
+              </a:ext>
+            </a:extLst>
+          </p:cNvPr>
+          <p:cNvSpPr>
+            <a:spLocks noChangeAspect="1" noChangeArrowheads="1"/>
+          </p:cNvSpPr>
           <p:nvPr/>
-        </p:nvPicPr>
-        <p:blipFill>
-          <a:blip r:embed="rId6"/>
-          <a:stretch>
-            <a:fillRect/>
-          </a:stretch>
-        </p:blipFill>
-        <p:spPr>
-          <a:xfrm>
-            <a:off x="2752981" y="4682864"/>
-            <a:ext cx="610937" cy="898436"/>
+        </p:nvSpPr>
+        <p:spPr bwMode="auto">
+          <a:xfrm>
+            <a:off x="265113" y="7937"/>
+            <a:ext cx="304800" cy="304801"/>
           </a:xfrm>
           <a:prstGeom prst="rect">
             <a:avLst/>
           </a:prstGeom>
-        </p:spPr>
-      </p:pic>
-      <p:pic>
-        <p:nvPicPr>
-          <p:cNvPr id="46" name="Picture 45">
-            <a:extLst>
-              <a:ext uri="{FF2B5EF4-FFF2-40B4-BE49-F238E27FC236}">
-                <a16:creationId xmlns:a16="http://schemas.microsoft.com/office/drawing/2014/main" id="{C84C65D1-E0BC-9F42-A1AE-8C3FC4477320}"/>
-              </a:ext>
-            </a:extLst>
-          </p:cNvPr>
-          <p:cNvPicPr>
-            <a:picLocks noChangeAspect="1"/>
-          </p:cNvPicPr>
-          <p:nvPr/>
-        </p:nvPicPr>
-        <p:blipFill>
-          <a:blip r:embed="rId6"/>
-          <a:stretch>
-            <a:fillRect/>
-          </a:stretch>
-        </p:blipFill>
-        <p:spPr>
-          <a:xfrm>
-            <a:off x="6060726" y="4697742"/>
-            <a:ext cx="610937" cy="898436"/>
-          </a:xfrm>
-          <a:prstGeom prst="rect">
-            <a:avLst/>
-          </a:prstGeom>
-        </p:spPr>
-      </p:pic>
-      <p:pic>
-        <p:nvPicPr>
-          <p:cNvPr id="47" name="Picture 46">
-            <a:extLst>
-              <a:ext uri="{FF2B5EF4-FFF2-40B4-BE49-F238E27FC236}">
-                <a16:creationId xmlns:a16="http://schemas.microsoft.com/office/drawing/2014/main" id="{75333758-5AB8-D443-90CE-9E1224B1644D}"/>
-              </a:ext>
-            </a:extLst>
-          </p:cNvPr>
-          <p:cNvPicPr>
-            <a:picLocks noChangeAspect="1"/>
-          </p:cNvPicPr>
-          <p:nvPr/>
-        </p:nvPicPr>
-        <p:blipFill>
-          <a:blip r:embed="rId7"/>
-          <a:stretch>
-            <a:fillRect/>
-          </a:stretch>
-        </p:blipFill>
-        <p:spPr>
-          <a:xfrm>
-            <a:off x="7480592" y="4117892"/>
-            <a:ext cx="1216332" cy="691828"/>
-          </a:xfrm>
-          <a:prstGeom prst="rect">
-            <a:avLst/>
-          </a:prstGeom>
-        </p:spPr>
-      </p:pic>
-      <p:pic>
-        <p:nvPicPr>
-          <p:cNvPr id="19" name="Picture 18">
-            <a:extLst>
-              <a:ext uri="{FF2B5EF4-FFF2-40B4-BE49-F238E27FC236}">
-                <a16:creationId xmlns:a16="http://schemas.microsoft.com/office/drawing/2014/main" id="{331DA705-5E27-3542-9820-A799A090064C}"/>
-              </a:ext>
-            </a:extLst>
-          </p:cNvPr>
-          <p:cNvPicPr>
-            <a:picLocks noChangeAspect="1"/>
-          </p:cNvPicPr>
-          <p:nvPr/>
-        </p:nvPicPr>
-        <p:blipFill>
-          <a:blip r:embed="rId8"/>
-          <a:stretch>
-            <a:fillRect/>
-          </a:stretch>
-        </p:blipFill>
-        <p:spPr>
-          <a:xfrm>
-            <a:off x="8552314" y="1890900"/>
-            <a:ext cx="457200" cy="457200"/>
-          </a:xfrm>
-          <a:prstGeom prst="rect">
-            <a:avLst/>
-          </a:prstGeom>
-        </p:spPr>
-      </p:pic>
+          <a:noFill/>
+          <a:extLst>
+            <a:ext uri="{909E8E84-426E-40DD-AFC4-6F175D3DCCD1}">
+              <a14:hiddenFill xmlns:a14="http://schemas.microsoft.com/office/drawing/2010/main">
+                <a:solidFill>
+                  <a:srgbClr val="FFFFFF"/>
+                </a:solidFill>
+              </a14:hiddenFill>
+            </a:ext>
+          </a:extLst>
+        </p:spPr>
+        <p:txBody>
+          <a:bodyPr vert="horz" wrap="square" lIns="91440" tIns="45720" rIns="91440" bIns="45720" numCol="1" anchor="t" anchorCtr="0" compatLnSpc="1">
+            <a:prstTxWarp prst="textNoShape">
+              <a:avLst/>
+            </a:prstTxWarp>
+          </a:bodyPr>
+          <a:lstStyle/>
+          <a:p>
+            <a:endParaRPr lang="en-US"/>
+          </a:p>
+        </p:txBody>
+      </p:sp>
     </p:spTree>
     <p:extLst>
       <p:ext uri="{BB962C8B-B14F-4D97-AF65-F5344CB8AC3E}">
@@ -6129,8 +5405,8 @@
         </p:nvSpPr>
         <p:spPr>
           <a:xfrm>
-            <a:off x="9698048" y="6488668"/>
-            <a:ext cx="2493952" cy="369332"/>
+            <a:off x="9244975" y="6395725"/>
+            <a:ext cx="2947025" cy="461665"/>
           </a:xfrm>
           <a:prstGeom prst="rect">
             <a:avLst/>
@@ -6144,24 +5420,42 @@
           <a:lstStyle/>
           <a:p>
             <a:r>
-              <a:rPr lang="en-US" dirty="0">
+              <a:rPr lang="en-US" sz="1200" dirty="0">
                 <a:hlinkClick r:id="rId3"/>
               </a:rPr>
               <a:t>https://openclipart.org/</a:t>
             </a:r>
-            <a:r>
-              <a:rPr lang="en-US" dirty="0"/>
-              <a:t> </a:t>
-            </a:r>
+            <a:endParaRPr lang="en-US" sz="1200" dirty="0"/>
+          </a:p>
+          <a:p>
+            <a:r>
+              <a:rPr lang="en-US" sz="1200" dirty="0">
+                <a:hlinkClick r:id="rId4"/>
+              </a:rPr>
+              <a:t>https://</a:t>
+            </a:r>
+            <a:r>
+              <a:rPr lang="en-US" sz="1200" dirty="0" err="1">
+                <a:hlinkClick r:id="rId4"/>
+              </a:rPr>
+              <a:t>unsplash.com</a:t>
+            </a:r>
+            <a:r>
+              <a:rPr lang="en-US" sz="1200" dirty="0">
+                <a:hlinkClick r:id="rId4"/>
+              </a:rPr>
+              <a:t>/photos/_sh9vkVbVgo </a:t>
+            </a:r>
+            <a:endParaRPr lang="en-US" sz="1200" dirty="0"/>
           </a:p>
         </p:txBody>
       </p:sp>
       <p:pic>
         <p:nvPicPr>
-          <p:cNvPr id="3" name="Picture 2" descr="Icon&#10;&#10;Description automatically generated">
-            <a:extLst>
-              <a:ext uri="{FF2B5EF4-FFF2-40B4-BE49-F238E27FC236}">
-                <a16:creationId xmlns:a16="http://schemas.microsoft.com/office/drawing/2014/main" id="{B79CE5A7-CC45-0743-A7E8-9F20FFEA93EF}"/>
+          <p:cNvPr id="5" name="Picture 4" descr="A person covering her face with her hands&#10;&#10;Description automatically generated">
+            <a:extLst>
+              <a:ext uri="{FF2B5EF4-FFF2-40B4-BE49-F238E27FC236}">
+                <a16:creationId xmlns:a16="http://schemas.microsoft.com/office/drawing/2014/main" id="{E86E1B15-8D45-D849-91BC-06F96FCE82C8}"/>
               </a:ext>
             </a:extLst>
           </p:cNvPr>
@@ -6171,15 +5465,15 @@
           <p:nvPr/>
         </p:nvPicPr>
         <p:blipFill>
-          <a:blip r:embed="rId4"/>
+          <a:blip r:embed="rId5"/>
           <a:stretch>
             <a:fillRect/>
           </a:stretch>
         </p:blipFill>
         <p:spPr>
-          <a:xfrm flipH="1">
-            <a:off x="4000481" y="512113"/>
-            <a:ext cx="1779333" cy="2192511"/>
+          <a:xfrm>
+            <a:off x="3901719" y="650612"/>
+            <a:ext cx="1878095" cy="2103782"/>
           </a:xfrm>
           <a:prstGeom prst="rect">
             <a:avLst/>

</xml_diff>